<commit_message>
pasando de ol a leaflet
</commit_message>
<xml_diff>
--- a/slides.pptx
+++ b/slides.pptx
@@ -108,6 +108,11 @@
       </a:defRPr>
     </a:lvl9pPr>
   </p:defaultTextStyle>
+  <p:extLst>
+    <p:ext uri="{EFAFB233-063F-42B5-8137-9DF3F51BA10A}">
+      <p15:sldGuideLst xmlns:p15="http://schemas.microsoft.com/office/powerpoint/2012/main"/>
+    </p:ext>
+  </p:extLst>
 </p:presentation>
 </file>
 
@@ -267,7 +272,7 @@
           <a:p>
             <a:fld id="{02AC24A9-CCB6-4F8D-B8DB-C2F3692CFA5A}" type="datetimeFigureOut">
               <a:rPr lang="en-US" smtClean="0"/>
-              <a:t>12/21/2020</a:t>
+              <a:t>1/28/2021</a:t>
             </a:fld>
             <a:endParaRPr lang="en-US" dirty="0"/>
           </a:p>
@@ -637,7 +642,7 @@
           <a:p>
             <a:fld id="{02AC24A9-CCB6-4F8D-B8DB-C2F3692CFA5A}" type="datetimeFigureOut">
               <a:rPr lang="en-US" smtClean="0"/>
-              <a:t>12/21/2020</a:t>
+              <a:t>1/28/2021</a:t>
             </a:fld>
             <a:endParaRPr lang="en-US"/>
           </a:p>
@@ -846,7 +851,7 @@
           <a:p>
             <a:fld id="{02AC24A9-CCB6-4F8D-B8DB-C2F3692CFA5A}" type="datetimeFigureOut">
               <a:rPr lang="en-US" smtClean="0"/>
-              <a:t>12/21/2020</a:t>
+              <a:t>1/28/2021</a:t>
             </a:fld>
             <a:endParaRPr lang="en-US"/>
           </a:p>
@@ -1316,7 +1321,7 @@
           <a:p>
             <a:fld id="{02AC24A9-CCB6-4F8D-B8DB-C2F3692CFA5A}" type="datetimeFigureOut">
               <a:rPr lang="en-US" smtClean="0"/>
-              <a:t>12/21/2020</a:t>
+              <a:t>1/28/2021</a:t>
             </a:fld>
             <a:endParaRPr lang="en-US"/>
           </a:p>
@@ -1770,7 +1775,7 @@
           <a:p>
             <a:fld id="{02AC24A9-CCB6-4F8D-B8DB-C2F3692CFA5A}" type="datetimeFigureOut">
               <a:rPr lang="en-US" smtClean="0"/>
-              <a:t>12/21/2020</a:t>
+              <a:t>1/28/2021</a:t>
             </a:fld>
             <a:endParaRPr lang="en-US"/>
           </a:p>
@@ -2302,7 +2307,7 @@
           <a:p>
             <a:fld id="{02AC24A9-CCB6-4F8D-B8DB-C2F3692CFA5A}" type="datetimeFigureOut">
               <a:rPr lang="en-US" smtClean="0"/>
-              <a:t>12/21/2020</a:t>
+              <a:t>1/28/2021</a:t>
             </a:fld>
             <a:endParaRPr lang="en-US"/>
           </a:p>
@@ -3001,7 +3006,7 @@
           <a:p>
             <a:fld id="{02AC24A9-CCB6-4F8D-B8DB-C2F3692CFA5A}" type="datetimeFigureOut">
               <a:rPr lang="en-US" smtClean="0"/>
-              <a:t>12/21/2020</a:t>
+              <a:t>1/28/2021</a:t>
             </a:fld>
             <a:endParaRPr lang="en-US"/>
           </a:p>
@@ -3330,7 +3335,7 @@
           <a:p>
             <a:fld id="{02AC24A9-CCB6-4F8D-B8DB-C2F3692CFA5A}" type="datetimeFigureOut">
               <a:rPr lang="en-US" smtClean="0"/>
-              <a:t>12/21/2020</a:t>
+              <a:t>1/28/2021</a:t>
             </a:fld>
             <a:endParaRPr lang="en-US"/>
           </a:p>
@@ -3443,7 +3448,7 @@
           <a:p>
             <a:fld id="{02AC24A9-CCB6-4F8D-B8DB-C2F3692CFA5A}" type="datetimeFigureOut">
               <a:rPr lang="en-US" smtClean="0"/>
-              <a:t>12/21/2020</a:t>
+              <a:t>1/28/2021</a:t>
             </a:fld>
             <a:endParaRPr lang="en-US"/>
           </a:p>
@@ -3938,7 +3943,7 @@
           <a:p>
             <a:fld id="{02AC24A9-CCB6-4F8D-B8DB-C2F3692CFA5A}" type="datetimeFigureOut">
               <a:rPr lang="en-US" smtClean="0"/>
-              <a:t>12/21/2020</a:t>
+              <a:t>1/28/2021</a:t>
             </a:fld>
             <a:endParaRPr lang="en-US" dirty="0"/>
           </a:p>
@@ -4415,7 +4420,7 @@
           <a:p>
             <a:fld id="{02AC24A9-CCB6-4F8D-B8DB-C2F3692CFA5A}" type="datetimeFigureOut">
               <a:rPr lang="en-US" smtClean="0"/>
-              <a:t>12/21/2020</a:t>
+              <a:t>1/28/2021</a:t>
             </a:fld>
             <a:endParaRPr lang="en-US"/>
           </a:p>
@@ -4658,7 +4663,7 @@
           <a:p>
             <a:fld id="{02AC24A9-CCB6-4F8D-B8DB-C2F3692CFA5A}" type="datetimeFigureOut">
               <a:rPr lang="en-US" smtClean="0"/>
-              <a:t>12/21/2020</a:t>
+              <a:t>1/28/2021</a:t>
             </a:fld>
             <a:endParaRPr lang="en-US"/>
           </a:p>
@@ -5211,12 +5216,6 @@
               <a:t>Roy Yali Samaniego</a:t>
             </a:r>
           </a:p>
-          <a:p>
-            <a:r>
-              <a:rPr lang="es-PE" sz="2000" dirty="0"/>
-              <a:t>Fernando Prudencio Paredes</a:t>
-            </a:r>
-          </a:p>
         </p:txBody>
       </p:sp>
       <p:sp>
@@ -6203,24 +6202,18 @@
               <a:rPr lang="es-PE" dirty="0">
                 <a:hlinkClick r:id="rId2"/>
               </a:rPr>
-              <a:t>https://austriafloodmap.herokuapp.com/map</a:t>
-            </a:r>
-            <a:endParaRPr lang="es-PE" dirty="0"/>
-          </a:p>
-          <a:p>
-            <a:r>
-              <a:rPr lang="es-PE" dirty="0">
-                <a:hlinkClick r:id="rId3"/>
-              </a:rPr>
-              <a:t>https://turbo87.github.io/sidebar-v2/examples/</a:t>
-            </a:r>
-            <a:endParaRPr lang="es-PE" dirty="0"/>
-          </a:p>
-          <a:p>
+              <a:t>https://ryali93.github.io/senamhi_er/index.html</a:t>
+            </a:r>
             <a:r>
               <a:rPr lang="es-PE" dirty="0"/>
               <a:t> </a:t>
             </a:r>
+          </a:p>
+          <a:p>
+            <a:pPr marL="0" indent="0">
+              <a:buNone/>
+            </a:pPr>
+            <a:endParaRPr lang="es-PE" dirty="0"/>
           </a:p>
         </p:txBody>
       </p:sp>

</xml_diff>